<commit_message>
Removed vintage dates from historical pulls and added historical data SQL storage (v0.20)
</commit_message>
<xml_diff>
--- a/documentation-templates/images/logo-design.pptx
+++ b/documentation-templates/images/logo-design.pptx
@@ -6,6 +6,7 @@
   </p:sldMasterIdLst>
   <p:sldIdLst>
     <p:sldId id="256" r:id="rId2"/>
+    <p:sldId id="257" r:id="rId3"/>
   </p:sldIdLst>
   <p:sldSz cx="12192000" cy="6858000"/>
   <p:notesSz cx="6858000" cy="9144000"/>
@@ -104,6 +105,11 @@
       </a:defRPr>
     </a:lvl9pPr>
   </p:defaultTextStyle>
+  <p:extLst>
+    <p:ext uri="{EFAFB233-063F-42B5-8137-9DF3F51BA10A}">
+      <p15:sldGuideLst xmlns:p15="http://schemas.microsoft.com/office/powerpoint/2012/main"/>
+    </p:ext>
+  </p:extLst>
 </p:presentation>
 </file>
 
@@ -254,7 +260,7 @@
           <a:p>
             <a:fld id="{A7C790ED-1353-428C-9EC0-1379BDA992E3}" type="datetimeFigureOut">
               <a:rPr lang="en-US" smtClean="0"/>
-              <a:t>1/29/2021</a:t>
+              <a:t>1/5/2022</a:t>
             </a:fld>
             <a:endParaRPr lang="en-US"/>
           </a:p>
@@ -452,7 +458,7 @@
           <a:p>
             <a:fld id="{A7C790ED-1353-428C-9EC0-1379BDA992E3}" type="datetimeFigureOut">
               <a:rPr lang="en-US" smtClean="0"/>
-              <a:t>1/29/2021</a:t>
+              <a:t>1/5/2022</a:t>
             </a:fld>
             <a:endParaRPr lang="en-US"/>
           </a:p>
@@ -660,7 +666,7 @@
           <a:p>
             <a:fld id="{A7C790ED-1353-428C-9EC0-1379BDA992E3}" type="datetimeFigureOut">
               <a:rPr lang="en-US" smtClean="0"/>
-              <a:t>1/29/2021</a:t>
+              <a:t>1/5/2022</a:t>
             </a:fld>
             <a:endParaRPr lang="en-US"/>
           </a:p>
@@ -858,7 +864,7 @@
           <a:p>
             <a:fld id="{A7C790ED-1353-428C-9EC0-1379BDA992E3}" type="datetimeFigureOut">
               <a:rPr lang="en-US" smtClean="0"/>
-              <a:t>1/29/2021</a:t>
+              <a:t>1/5/2022</a:t>
             </a:fld>
             <a:endParaRPr lang="en-US"/>
           </a:p>
@@ -1133,7 +1139,7 @@
           <a:p>
             <a:fld id="{A7C790ED-1353-428C-9EC0-1379BDA992E3}" type="datetimeFigureOut">
               <a:rPr lang="en-US" smtClean="0"/>
-              <a:t>1/29/2021</a:t>
+              <a:t>1/5/2022</a:t>
             </a:fld>
             <a:endParaRPr lang="en-US"/>
           </a:p>
@@ -1398,7 +1404,7 @@
           <a:p>
             <a:fld id="{A7C790ED-1353-428C-9EC0-1379BDA992E3}" type="datetimeFigureOut">
               <a:rPr lang="en-US" smtClean="0"/>
-              <a:t>1/29/2021</a:t>
+              <a:t>1/5/2022</a:t>
             </a:fld>
             <a:endParaRPr lang="en-US"/>
           </a:p>
@@ -1810,7 +1816,7 @@
           <a:p>
             <a:fld id="{A7C790ED-1353-428C-9EC0-1379BDA992E3}" type="datetimeFigureOut">
               <a:rPr lang="en-US" smtClean="0"/>
-              <a:t>1/29/2021</a:t>
+              <a:t>1/5/2022</a:t>
             </a:fld>
             <a:endParaRPr lang="en-US"/>
           </a:p>
@@ -1951,7 +1957,7 @@
           <a:p>
             <a:fld id="{A7C790ED-1353-428C-9EC0-1379BDA992E3}" type="datetimeFigureOut">
               <a:rPr lang="en-US" smtClean="0"/>
-              <a:t>1/29/2021</a:t>
+              <a:t>1/5/2022</a:t>
             </a:fld>
             <a:endParaRPr lang="en-US"/>
           </a:p>
@@ -2064,7 +2070,7 @@
           <a:p>
             <a:fld id="{A7C790ED-1353-428C-9EC0-1379BDA992E3}" type="datetimeFigureOut">
               <a:rPr lang="en-US" smtClean="0"/>
-              <a:t>1/29/2021</a:t>
+              <a:t>1/5/2022</a:t>
             </a:fld>
             <a:endParaRPr lang="en-US"/>
           </a:p>
@@ -2375,7 +2381,7 @@
           <a:p>
             <a:fld id="{A7C790ED-1353-428C-9EC0-1379BDA992E3}" type="datetimeFigureOut">
               <a:rPr lang="en-US" smtClean="0"/>
-              <a:t>1/29/2021</a:t>
+              <a:t>1/5/2022</a:t>
             </a:fld>
             <a:endParaRPr lang="en-US"/>
           </a:p>
@@ -2663,7 +2669,7 @@
           <a:p>
             <a:fld id="{A7C790ED-1353-428C-9EC0-1379BDA992E3}" type="datetimeFigureOut">
               <a:rPr lang="en-US" smtClean="0"/>
-              <a:t>1/29/2021</a:t>
+              <a:t>1/5/2022</a:t>
             </a:fld>
             <a:endParaRPr lang="en-US"/>
           </a:p>
@@ -2904,7 +2910,7 @@
           <a:p>
             <a:fld id="{A7C790ED-1353-428C-9EC0-1379BDA992E3}" type="datetimeFigureOut">
               <a:rPr lang="en-US" smtClean="0"/>
-              <a:t>1/29/2021</a:t>
+              <a:t>1/5/2022</a:t>
             </a:fld>
             <a:endParaRPr lang="en-US"/>
           </a:p>
@@ -3376,15 +3382,11 @@
             <a:avLst/>
           </a:prstGeom>
           <a:solidFill>
-            <a:schemeClr val="accent6">
-              <a:lumMod val="75000"/>
-            </a:schemeClr>
+            <a:srgbClr val="2D8C26"/>
           </a:solidFill>
           <a:ln w="76200">
             <a:solidFill>
-              <a:schemeClr val="accent6">
-                <a:lumMod val="75000"/>
-              </a:schemeClr>
+              <a:srgbClr val="2D8C26"/>
             </a:solidFill>
           </a:ln>
         </p:spPr>
@@ -3425,8 +3427,8 @@
         </p:nvSpPr>
         <p:spPr>
           <a:xfrm>
-            <a:off x="3028697" y="2427667"/>
-            <a:ext cx="4299203" cy="1015663"/>
+            <a:off x="3028697" y="2489222"/>
+            <a:ext cx="5007956" cy="892552"/>
           </a:xfrm>
           <a:prstGeom prst="rect">
             <a:avLst/>
@@ -3440,28 +3442,26 @@
           <a:lstStyle/>
           <a:p>
             <a:r>
-              <a:rPr lang="en-US" sz="3000" spc="-150" dirty="0">
+              <a:rPr lang="en-US" sz="2600" spc="-150" dirty="0">
                 <a:solidFill>
-                  <a:schemeClr val="accent6">
-                    <a:lumMod val="75000"/>
-                  </a:schemeClr>
+                  <a:srgbClr val="2D8C26"/>
                 </a:solidFill>
-                <a:latin typeface="Molengo" panose="02000000000000000000" pitchFamily="2" charset="0"/>
+                <a:latin typeface="Poppins" panose="00000500000000000000" pitchFamily="2" charset="0"/>
+                <a:cs typeface="Poppins" panose="00000500000000000000" pitchFamily="2" charset="0"/>
               </a:rPr>
               <a:t>Center for Macroeconomic</a:t>
             </a:r>
           </a:p>
           <a:p>
             <a:r>
-              <a:rPr lang="en-US" sz="3000" spc="-150" dirty="0">
+              <a:rPr lang="en-US" sz="2600" spc="-150" dirty="0">
                 <a:solidFill>
-                  <a:schemeClr val="accent6">
-                    <a:lumMod val="75000"/>
-                  </a:schemeClr>
+                  <a:srgbClr val="2D8C26"/>
                 </a:solidFill>
-                <a:latin typeface="Molengo" panose="02000000000000000000" pitchFamily="2" charset="0"/>
+                <a:latin typeface="Poppins" panose="00000500000000000000" pitchFamily="2" charset="0"/>
+                <a:cs typeface="Poppins" panose="00000500000000000000" pitchFamily="2" charset="0"/>
               </a:rPr>
-              <a:t>Forecasts &amp; Insights</a:t>
+              <a:t>Forecasts &amp; Insights               </a:t>
             </a:r>
           </a:p>
         </p:txBody>
@@ -3659,8 +3659,8 @@
         </p:nvSpPr>
         <p:spPr>
           <a:xfrm>
-            <a:off x="3028697" y="3768787"/>
-            <a:ext cx="4389373" cy="1015663"/>
+            <a:off x="3028697" y="3830343"/>
+            <a:ext cx="5695853" cy="892552"/>
           </a:xfrm>
           <a:prstGeom prst="rect">
             <a:avLst/>
@@ -3674,22 +3674,24 @@
           <a:lstStyle/>
           <a:p>
             <a:r>
-              <a:rPr lang="en-US" sz="3000" spc="-150" dirty="0">
+              <a:rPr lang="en-US" sz="2600" spc="-150" dirty="0">
                 <a:solidFill>
                   <a:schemeClr val="bg1"/>
                 </a:solidFill>
-                <a:latin typeface="Molengo" panose="02000000000000000000" pitchFamily="2" charset="0"/>
+                <a:latin typeface="Poppins" panose="00000500000000000000" pitchFamily="2" charset="0"/>
+                <a:cs typeface="Poppins" panose="00000500000000000000" pitchFamily="2" charset="0"/>
               </a:rPr>
               <a:t>Center for Macroeconomic</a:t>
             </a:r>
           </a:p>
           <a:p>
             <a:r>
-              <a:rPr lang="en-US" sz="3000" spc="-150" dirty="0">
+              <a:rPr lang="en-US" sz="2600" spc="-150" dirty="0">
                 <a:solidFill>
                   <a:schemeClr val="bg1"/>
                 </a:solidFill>
-                <a:latin typeface="Molengo" panose="02000000000000000000" pitchFamily="2" charset="0"/>
+                <a:latin typeface="Poppins" panose="00000500000000000000" pitchFamily="2" charset="0"/>
+                <a:cs typeface="Poppins" panose="00000500000000000000" pitchFamily="2" charset="0"/>
               </a:rPr>
               <a:t>Forecasts &amp; Insights</a:t>
             </a:r>
@@ -3786,15 +3788,11 @@
             </a:pathLst>
           </a:custGeom>
           <a:solidFill>
-            <a:schemeClr val="accent6">
-              <a:lumMod val="75000"/>
-            </a:schemeClr>
+            <a:srgbClr val="2D8C26"/>
           </a:solidFill>
           <a:ln>
             <a:solidFill>
-              <a:schemeClr val="accent6">
-                <a:lumMod val="75000"/>
-              </a:schemeClr>
+              <a:srgbClr val="2D8C26"/>
             </a:solidFill>
           </a:ln>
         </p:spPr>
@@ -3823,10 +3821,517 @@
           </a:p>
         </p:txBody>
       </p:sp>
+      <p:sp>
+        <p:nvSpPr>
+          <p:cNvPr id="2" name="Plus Sign 1">
+            <a:extLst>
+              <a:ext uri="{FF2B5EF4-FFF2-40B4-BE49-F238E27FC236}">
+                <a16:creationId xmlns:a16="http://schemas.microsoft.com/office/drawing/2014/main" id="{D85199EC-F62D-4790-8D7A-07D1515C58F1}"/>
+              </a:ext>
+            </a:extLst>
+          </p:cNvPr>
+          <p:cNvSpPr/>
+          <p:nvPr/>
+        </p:nvSpPr>
+        <p:spPr>
+          <a:xfrm>
+            <a:off x="7349176" y="4361946"/>
+            <a:ext cx="274320" cy="274320"/>
+          </a:xfrm>
+          <a:prstGeom prst="mathPlus">
+            <a:avLst/>
+          </a:prstGeom>
+          <a:solidFill>
+            <a:schemeClr val="bg1"/>
+          </a:solidFill>
+          <a:ln>
+            <a:solidFill>
+              <a:srgbClr val="2D8C26"/>
+            </a:solidFill>
+          </a:ln>
+        </p:spPr>
+        <p:style>
+          <a:lnRef idx="2">
+            <a:schemeClr val="accent6">
+              <a:shade val="50000"/>
+            </a:schemeClr>
+          </a:lnRef>
+          <a:fillRef idx="1">
+            <a:schemeClr val="accent6"/>
+          </a:fillRef>
+          <a:effectRef idx="0">
+            <a:schemeClr val="accent6"/>
+          </a:effectRef>
+          <a:fontRef idx="minor">
+            <a:schemeClr val="lt1"/>
+          </a:fontRef>
+        </p:style>
+        <p:txBody>
+          <a:bodyPr rtlCol="0" anchor="ctr"/>
+          <a:lstStyle/>
+          <a:p>
+            <a:pPr algn="ctr"/>
+            <a:endParaRPr lang="en-US">
+              <a:solidFill>
+                <a:schemeClr val="bg1"/>
+              </a:solidFill>
+            </a:endParaRPr>
+          </a:p>
+        </p:txBody>
+      </p:sp>
+      <p:sp>
+        <p:nvSpPr>
+          <p:cNvPr id="9" name="Plus Sign 8">
+            <a:extLst>
+              <a:ext uri="{FF2B5EF4-FFF2-40B4-BE49-F238E27FC236}">
+                <a16:creationId xmlns:a16="http://schemas.microsoft.com/office/drawing/2014/main" id="{ECA7BA25-BFD0-438B-8A29-0096CB40F3BC}"/>
+              </a:ext>
+            </a:extLst>
+          </p:cNvPr>
+          <p:cNvSpPr/>
+          <p:nvPr/>
+        </p:nvSpPr>
+        <p:spPr>
+          <a:xfrm>
+            <a:off x="7349176" y="3026939"/>
+            <a:ext cx="274320" cy="274320"/>
+          </a:xfrm>
+          <a:prstGeom prst="mathPlus">
+            <a:avLst/>
+          </a:prstGeom>
+          <a:solidFill>
+            <a:srgbClr val="2D8C26"/>
+          </a:solidFill>
+        </p:spPr>
+        <p:style>
+          <a:lnRef idx="2">
+            <a:schemeClr val="accent6">
+              <a:shade val="50000"/>
+            </a:schemeClr>
+          </a:lnRef>
+          <a:fillRef idx="1">
+            <a:schemeClr val="accent6"/>
+          </a:fillRef>
+          <a:effectRef idx="0">
+            <a:schemeClr val="accent6"/>
+          </a:effectRef>
+          <a:fontRef idx="minor">
+            <a:schemeClr val="lt1"/>
+          </a:fontRef>
+        </p:style>
+        <p:txBody>
+          <a:bodyPr rtlCol="0" anchor="ctr"/>
+          <a:lstStyle/>
+          <a:p>
+            <a:pPr algn="ctr"/>
+            <a:endParaRPr lang="en-US" dirty="0"/>
+          </a:p>
+        </p:txBody>
+      </p:sp>
     </p:spTree>
     <p:extLst>
       <p:ext uri="{BB962C8B-B14F-4D97-AF65-F5344CB8AC3E}">
         <p14:creationId xmlns:p14="http://schemas.microsoft.com/office/powerpoint/2010/main" val="1470143751"/>
+      </p:ext>
+    </p:extLst>
+  </p:cSld>
+  <p:clrMapOvr>
+    <a:masterClrMapping/>
+  </p:clrMapOvr>
+</p:sld>
+</file>
+
+<file path=ppt/slides/slide2.xml><?xml version="1.0" encoding="utf-8"?>
+<p:sld xmlns:a="http://schemas.openxmlformats.org/drawingml/2006/main" xmlns:r="http://schemas.openxmlformats.org/officeDocument/2006/relationships" xmlns:p="http://schemas.openxmlformats.org/presentationml/2006/main">
+  <p:cSld>
+    <p:bg>
+      <p:bgPr>
+        <a:gradFill>
+          <a:gsLst>
+            <a:gs pos="0">
+              <a:schemeClr val="accent1">
+                <a:lumMod val="5000"/>
+                <a:lumOff val="95000"/>
+              </a:schemeClr>
+            </a:gs>
+            <a:gs pos="74000">
+              <a:schemeClr val="accent1">
+                <a:lumMod val="45000"/>
+                <a:lumOff val="55000"/>
+              </a:schemeClr>
+            </a:gs>
+            <a:gs pos="83000">
+              <a:schemeClr val="accent1">
+                <a:lumMod val="45000"/>
+                <a:lumOff val="55000"/>
+              </a:schemeClr>
+            </a:gs>
+            <a:gs pos="100000">
+              <a:schemeClr val="accent1">
+                <a:lumMod val="30000"/>
+                <a:lumOff val="70000"/>
+              </a:schemeClr>
+            </a:gs>
+          </a:gsLst>
+          <a:lin ang="5400000" scaled="1"/>
+        </a:gradFill>
+        <a:effectLst/>
+      </p:bgPr>
+    </p:bg>
+    <p:spTree>
+      <p:nvGrpSpPr>
+        <p:cNvPr id="1" name=""/>
+        <p:cNvGrpSpPr/>
+        <p:nvPr/>
+      </p:nvGrpSpPr>
+      <p:grpSpPr>
+        <a:xfrm>
+          <a:off x="0" y="0"/>
+          <a:ext cx="0" cy="0"/>
+          <a:chOff x="0" y="0"/>
+          <a:chExt cx="0" cy="0"/>
+        </a:xfrm>
+      </p:grpSpPr>
+      <p:sp>
+        <p:nvSpPr>
+          <p:cNvPr id="2" name="Title 1">
+            <a:extLst>
+              <a:ext uri="{FF2B5EF4-FFF2-40B4-BE49-F238E27FC236}">
+                <a16:creationId xmlns:a16="http://schemas.microsoft.com/office/drawing/2014/main" id="{55ABCAC0-EBCB-4688-9F30-0FB2F7FEFE92}"/>
+              </a:ext>
+            </a:extLst>
+          </p:cNvPr>
+          <p:cNvSpPr>
+            <a:spLocks noGrp="1"/>
+          </p:cNvSpPr>
+          <p:nvPr>
+            <p:ph type="title"/>
+          </p:nvPr>
+        </p:nvSpPr>
+        <p:spPr/>
+        <p:txBody>
+          <a:bodyPr/>
+          <a:lstStyle/>
+          <a:p>
+            <a:endParaRPr lang="en-US"/>
+          </a:p>
+        </p:txBody>
+      </p:sp>
+      <p:grpSp>
+        <p:nvGrpSpPr>
+          <p:cNvPr id="3" name="Group 2">
+            <a:extLst>
+              <a:ext uri="{FF2B5EF4-FFF2-40B4-BE49-F238E27FC236}">
+                <a16:creationId xmlns:a16="http://schemas.microsoft.com/office/drawing/2014/main" id="{AAE06BEB-2E19-4CC8-92B1-D76348896BC5}"/>
+              </a:ext>
+            </a:extLst>
+          </p:cNvPr>
+          <p:cNvGrpSpPr/>
+          <p:nvPr/>
+        </p:nvGrpSpPr>
+        <p:grpSpPr>
+          <a:xfrm>
+            <a:off x="2207007" y="3830343"/>
+            <a:ext cx="5211063" cy="892552"/>
+            <a:chOff x="2207007" y="3830343"/>
+            <a:chExt cx="5211063" cy="892552"/>
+          </a:xfrm>
+        </p:grpSpPr>
+        <p:sp>
+          <p:nvSpPr>
+            <p:cNvPr id="11" name="Oval 10">
+              <a:extLst>
+                <a:ext uri="{FF2B5EF4-FFF2-40B4-BE49-F238E27FC236}">
+                  <a16:creationId xmlns:a16="http://schemas.microsoft.com/office/drawing/2014/main" id="{6D2B7DA4-8DB7-47DA-B501-9E0CF4E13879}"/>
+                </a:ext>
+              </a:extLst>
+            </p:cNvPr>
+            <p:cNvSpPr/>
+            <p:nvPr/>
+          </p:nvSpPr>
+          <p:spPr>
+            <a:xfrm>
+              <a:off x="2207007" y="3910859"/>
+              <a:ext cx="731520" cy="731520"/>
+            </a:xfrm>
+            <a:prstGeom prst="ellipse">
+              <a:avLst/>
+            </a:prstGeom>
+            <a:solidFill>
+              <a:schemeClr val="bg1"/>
+            </a:solidFill>
+            <a:ln w="76200">
+              <a:solidFill>
+                <a:schemeClr val="bg1"/>
+              </a:solidFill>
+            </a:ln>
+          </p:spPr>
+          <p:style>
+            <a:lnRef idx="3">
+              <a:schemeClr val="lt1"/>
+            </a:lnRef>
+            <a:fillRef idx="1">
+              <a:schemeClr val="accent6"/>
+            </a:fillRef>
+            <a:effectRef idx="1">
+              <a:schemeClr val="accent6"/>
+            </a:effectRef>
+            <a:fontRef idx="minor">
+              <a:schemeClr val="lt1"/>
+            </a:fontRef>
+          </p:style>
+          <p:txBody>
+            <a:bodyPr rtlCol="0" anchor="ctr"/>
+            <a:lstStyle/>
+            <a:p>
+              <a:pPr algn="ctr"/>
+              <a:endParaRPr lang="en-US">
+                <a:solidFill>
+                  <a:schemeClr val="accent6"/>
+                </a:solidFill>
+              </a:endParaRPr>
+            </a:p>
+          </p:txBody>
+        </p:sp>
+        <p:sp>
+          <p:nvSpPr>
+            <p:cNvPr id="12" name="TextBox 11">
+              <a:extLst>
+                <a:ext uri="{FF2B5EF4-FFF2-40B4-BE49-F238E27FC236}">
+                  <a16:creationId xmlns:a16="http://schemas.microsoft.com/office/drawing/2014/main" id="{919AD3A8-8E19-47BF-9F5D-8D8C056F0085}"/>
+                </a:ext>
+              </a:extLst>
+            </p:cNvPr>
+            <p:cNvSpPr txBox="1"/>
+            <p:nvPr/>
+          </p:nvSpPr>
+          <p:spPr>
+            <a:xfrm>
+              <a:off x="3028697" y="3830343"/>
+              <a:ext cx="4389373" cy="892552"/>
+            </a:xfrm>
+            <a:prstGeom prst="rect">
+              <a:avLst/>
+            </a:prstGeom>
+            <a:noFill/>
+          </p:spPr>
+          <p:txBody>
+            <a:bodyPr wrap="square" rtlCol="0" anchor="ctr">
+              <a:spAutoFit/>
+            </a:bodyPr>
+            <a:lstStyle/>
+            <a:p>
+              <a:r>
+                <a:rPr lang="en-US" sz="2600" spc="-150" dirty="0">
+                  <a:solidFill>
+                    <a:schemeClr val="bg1"/>
+                  </a:solidFill>
+                  <a:latin typeface="Poppins" panose="00000500000000000000" pitchFamily="2" charset="0"/>
+                  <a:cs typeface="Poppins" panose="00000500000000000000" pitchFamily="2" charset="0"/>
+                </a:rPr>
+                <a:t>Center for Macroeconomic  </a:t>
+              </a:r>
+            </a:p>
+            <a:p>
+              <a:r>
+                <a:rPr lang="en-US" sz="2600" spc="-150" dirty="0">
+                  <a:solidFill>
+                    <a:schemeClr val="bg1"/>
+                  </a:solidFill>
+                  <a:latin typeface="Poppins" panose="00000500000000000000" pitchFamily="2" charset="0"/>
+                  <a:cs typeface="Poppins" panose="00000500000000000000" pitchFamily="2" charset="0"/>
+                </a:rPr>
+                <a:t>Forecasts &amp; Insights</a:t>
+              </a:r>
+            </a:p>
+          </p:txBody>
+        </p:sp>
+        <p:sp>
+          <p:nvSpPr>
+            <p:cNvPr id="13" name="Freeform: Shape 12">
+              <a:extLst>
+                <a:ext uri="{FF2B5EF4-FFF2-40B4-BE49-F238E27FC236}">
+                  <a16:creationId xmlns:a16="http://schemas.microsoft.com/office/drawing/2014/main" id="{B9D733A8-382B-457A-AA71-35D4F07D9D42}"/>
+                </a:ext>
+              </a:extLst>
+            </p:cNvPr>
+            <p:cNvSpPr/>
+            <p:nvPr/>
+          </p:nvSpPr>
+          <p:spPr>
+            <a:xfrm>
+              <a:off x="2224386" y="3871406"/>
+              <a:ext cx="730314" cy="626339"/>
+            </a:xfrm>
+            <a:custGeom>
+              <a:avLst/>
+              <a:gdLst>
+                <a:gd name="connsiteX0" fmla="*/ 19 w 730314"/>
+                <a:gd name="connsiteY0" fmla="*/ 609789 h 626339"/>
+                <a:gd name="connsiteX1" fmla="*/ 387369 w 730314"/>
+                <a:gd name="connsiteY1" fmla="*/ 565339 h 626339"/>
+                <a:gd name="connsiteX2" fmla="*/ 730269 w 730314"/>
+                <a:gd name="connsiteY2" fmla="*/ 298639 h 626339"/>
+                <a:gd name="connsiteX3" fmla="*/ 365144 w 730314"/>
+                <a:gd name="connsiteY3" fmla="*/ 189 h 626339"/>
+                <a:gd name="connsiteX4" fmla="*/ 403244 w 730314"/>
+                <a:gd name="connsiteY4" fmla="*/ 343089 h 626339"/>
+                <a:gd name="connsiteX5" fmla="*/ 19 w 730314"/>
+                <a:gd name="connsiteY5" fmla="*/ 609789 h 626339"/>
+              </a:gdLst>
+              <a:ahLst/>
+              <a:cxnLst>
+                <a:cxn ang="0">
+                  <a:pos x="connsiteX0" y="connsiteY0"/>
+                </a:cxn>
+                <a:cxn ang="0">
+                  <a:pos x="connsiteX1" y="connsiteY1"/>
+                </a:cxn>
+                <a:cxn ang="0">
+                  <a:pos x="connsiteX2" y="connsiteY2"/>
+                </a:cxn>
+                <a:cxn ang="0">
+                  <a:pos x="connsiteX3" y="connsiteY3"/>
+                </a:cxn>
+                <a:cxn ang="0">
+                  <a:pos x="connsiteX4" y="connsiteY4"/>
+                </a:cxn>
+                <a:cxn ang="0">
+                  <a:pos x="connsiteX5" y="connsiteY5"/>
+                </a:cxn>
+              </a:cxnLst>
+              <a:rect l="l" t="t" r="r" b="b"/>
+              <a:pathLst>
+                <a:path w="730314" h="626339">
+                  <a:moveTo>
+                    <a:pt x="19" y="609789"/>
+                  </a:moveTo>
+                  <a:cubicBezTo>
+                    <a:pt x="-2627" y="646831"/>
+                    <a:pt x="265661" y="617197"/>
+                    <a:pt x="387369" y="565339"/>
+                  </a:cubicBezTo>
+                  <a:cubicBezTo>
+                    <a:pt x="509077" y="513481"/>
+                    <a:pt x="733973" y="392830"/>
+                    <a:pt x="730269" y="298639"/>
+                  </a:cubicBezTo>
+                  <a:cubicBezTo>
+                    <a:pt x="726565" y="204448"/>
+                    <a:pt x="419648" y="-7219"/>
+                    <a:pt x="365144" y="189"/>
+                  </a:cubicBezTo>
+                  <a:cubicBezTo>
+                    <a:pt x="310640" y="7597"/>
+                    <a:pt x="463569" y="241489"/>
+                    <a:pt x="403244" y="343089"/>
+                  </a:cubicBezTo>
+                  <a:cubicBezTo>
+                    <a:pt x="342919" y="444689"/>
+                    <a:pt x="2665" y="572747"/>
+                    <a:pt x="19" y="609789"/>
+                  </a:cubicBezTo>
+                  <a:close/>
+                </a:path>
+              </a:pathLst>
+            </a:custGeom>
+            <a:solidFill>
+              <a:srgbClr val="2D8C26"/>
+            </a:solidFill>
+            <a:ln>
+              <a:solidFill>
+                <a:srgbClr val="2D8C26"/>
+              </a:solidFill>
+            </a:ln>
+          </p:spPr>
+          <p:style>
+            <a:lnRef idx="2">
+              <a:schemeClr val="accent1">
+                <a:shade val="50000"/>
+              </a:schemeClr>
+            </a:lnRef>
+            <a:fillRef idx="1">
+              <a:schemeClr val="accent1"/>
+            </a:fillRef>
+            <a:effectRef idx="0">
+              <a:schemeClr val="accent1"/>
+            </a:effectRef>
+            <a:fontRef idx="minor">
+              <a:schemeClr val="lt1"/>
+            </a:fontRef>
+          </p:style>
+          <p:txBody>
+            <a:bodyPr rtlCol="0" anchor="ctr"/>
+            <a:lstStyle/>
+            <a:p>
+              <a:pPr algn="ctr"/>
+              <a:endParaRPr lang="en-US"/>
+            </a:p>
+          </p:txBody>
+        </p:sp>
+        <p:sp>
+          <p:nvSpPr>
+            <p:cNvPr id="14" name="Plus Sign 13">
+              <a:extLst>
+                <a:ext uri="{FF2B5EF4-FFF2-40B4-BE49-F238E27FC236}">
+                  <a16:creationId xmlns:a16="http://schemas.microsoft.com/office/drawing/2014/main" id="{38EA5B7E-5A42-4E8F-85C9-5D1CC3D8E6B4}"/>
+                </a:ext>
+              </a:extLst>
+            </p:cNvPr>
+            <p:cNvSpPr/>
+            <p:nvPr/>
+          </p:nvSpPr>
+          <p:spPr>
+            <a:xfrm>
+              <a:off x="6812280" y="4370004"/>
+              <a:ext cx="274320" cy="274320"/>
+            </a:xfrm>
+            <a:prstGeom prst="mathPlus">
+              <a:avLst/>
+            </a:prstGeom>
+            <a:solidFill>
+              <a:schemeClr val="bg1"/>
+            </a:solidFill>
+            <a:ln>
+              <a:solidFill>
+                <a:schemeClr val="bg1"/>
+              </a:solidFill>
+            </a:ln>
+          </p:spPr>
+          <p:style>
+            <a:lnRef idx="2">
+              <a:schemeClr val="accent6">
+                <a:shade val="50000"/>
+              </a:schemeClr>
+            </a:lnRef>
+            <a:fillRef idx="1">
+              <a:schemeClr val="accent6"/>
+            </a:fillRef>
+            <a:effectRef idx="0">
+              <a:schemeClr val="accent6"/>
+            </a:effectRef>
+            <a:fontRef idx="minor">
+              <a:schemeClr val="lt1"/>
+            </a:fontRef>
+          </p:style>
+          <p:txBody>
+            <a:bodyPr rtlCol="0" anchor="ctr"/>
+            <a:lstStyle/>
+            <a:p>
+              <a:pPr algn="ctr"/>
+              <a:endParaRPr lang="en-US">
+                <a:solidFill>
+                  <a:schemeClr val="bg1"/>
+                </a:solidFill>
+              </a:endParaRPr>
+            </a:p>
+          </p:txBody>
+        </p:sp>
+      </p:grpSp>
+    </p:spTree>
+    <p:extLst>
+      <p:ext uri="{BB962C8B-B14F-4D97-AF65-F5344CB8AC3E}">
+        <p14:creationId xmlns:p14="http://schemas.microsoft.com/office/powerpoint/2010/main" val="675865952"/>
       </p:ext>
     </p:extLst>
   </p:cSld>

</xml_diff>